<commit_message>
The Final Presentation is added
</commit_message>
<xml_diff>
--- a/Documentation/SlugSoft_Visualizr Final Presentation .pptx
+++ b/Documentation/SlugSoft_Visualizr Final Presentation .pptx
@@ -223,6 +223,11 @@
       </a:defRPr>
     </a:lvl9pPr>
   </p:defaultTextStyle>
+  <p:extLst>
+    <p:ext uri="{EFAFB233-063F-42B5-8137-9DF3F51BA10A}">
+      <p15:sldGuideLst xmlns:p15="http://schemas.microsoft.com/office/powerpoint/2012/main"/>
+    </p:ext>
+  </p:extLst>
 </p:presentation>
 </file>
 
@@ -1285,7 +1290,7 @@
         </p:nvSpPr>
         <p:spPr>
           <a:xfrm>
-            <a:off x="381300" y="685800"/>
+            <a:off x="381000" y="685800"/>
             <a:ext cx="6096000" cy="3429000"/>
           </a:xfrm>
           <a:custGeom>
@@ -5474,16 +5479,28 @@
           </a:bodyPr>
           <a:lstStyle/>
           <a:p>
-            <a:pPr lvl="0">
-              <a:spcBef>
-                <a:spcPts val="0"/>
-              </a:spcBef>
-              <a:buNone/>
-            </a:pPr>
-            <a:r>
-              <a:rPr lang="en"/>
-              <a:t>Questions:</a:t>
-            </a:r>
+            <a:pPr lvl="0"/>
+            <a:r>
+              <a:rPr lang="en-US" sz="4400" i="1" u="sng" dirty="0" smtClean="0">
+                <a:solidFill>
+                  <a:srgbClr val="FFFFFF"/>
+                </a:solidFill>
+                <a:latin typeface="Roboto Slab"/>
+                <a:ea typeface="Roboto Slab"/>
+                <a:cs typeface="Roboto Slab"/>
+                <a:sym typeface="Roboto Slab"/>
+              </a:rPr>
+              <a:t>Questions</a:t>
+            </a:r>
+            <a:endParaRPr lang="en" sz="4400" i="1" u="sng" dirty="0">
+              <a:solidFill>
+                <a:srgbClr val="FFFFFF"/>
+              </a:solidFill>
+              <a:latin typeface="Roboto Slab"/>
+              <a:ea typeface="Roboto Slab"/>
+              <a:cs typeface="Roboto Slab"/>
+              <a:sym typeface="Roboto Slab"/>
+            </a:endParaRPr>
           </a:p>
         </p:txBody>
       </p:sp>
@@ -5519,7 +5536,7 @@
               <a:buNone/>
             </a:pPr>
             <a:r>
-              <a:rPr lang="en" sz="9600">
+              <a:rPr lang="en" sz="9600" dirty="0">
                 <a:solidFill>
                   <a:srgbClr val="FFFFFF"/>
                 </a:solidFill>
@@ -6203,11 +6220,28 @@
           <a:bodyPr/>
           <a:lstStyle/>
           <a:p>
-            <a:r>
-              <a:rPr lang="en-US" smtClean="0"/>
+            <a:pPr lvl="0"/>
+            <a:r>
+              <a:rPr lang="en-US" sz="4400" i="1" u="sng" dirty="0" smtClean="0">
+                <a:solidFill>
+                  <a:srgbClr val="FFFFFF"/>
+                </a:solidFill>
+                <a:latin typeface="Roboto Slab"/>
+                <a:ea typeface="Roboto Slab"/>
+                <a:cs typeface="Roboto Slab"/>
+                <a:sym typeface="Roboto Slab"/>
+              </a:rPr>
               <a:t>Goals</a:t>
             </a:r>
-            <a:endParaRPr lang="en-US"/>
+            <a:endParaRPr lang="en" sz="4400" i="1" u="sng" dirty="0">
+              <a:solidFill>
+                <a:srgbClr val="FFFFFF"/>
+              </a:solidFill>
+              <a:latin typeface="Roboto Slab"/>
+              <a:ea typeface="Roboto Slab"/>
+              <a:cs typeface="Roboto Slab"/>
+              <a:sym typeface="Roboto Slab"/>
+            </a:endParaRPr>
           </a:p>
         </p:txBody>
       </p:sp>
@@ -6220,7 +6254,7 @@
         <p:spPr>
           <a:xfrm>
             <a:off x="435006" y="969264"/>
-            <a:ext cx="8380520" cy="3908762"/>
+            <a:ext cx="8380520" cy="4124206"/>
           </a:xfrm>
           <a:prstGeom prst="rect">
             <a:avLst/>
@@ -6373,6 +6407,9 @@
           </a:p>
           <a:p>
             <a:pPr marL="285750" indent="-285750">
+              <a:lnSpc>
+                <a:spcPct val="150000"/>
+              </a:lnSpc>
               <a:buFont typeface="Arial" charset="0"/>
               <a:buChar char="•"/>
             </a:pPr>
@@ -6387,6 +6424,9 @@
           </a:p>
           <a:p>
             <a:pPr marL="285750" indent="-285750">
+              <a:lnSpc>
+                <a:spcPct val="150000"/>
+              </a:lnSpc>
               <a:buFont typeface="Arial" charset="0"/>
               <a:buChar char="•"/>
             </a:pPr>
@@ -6500,20 +6540,40 @@
           </a:bodyPr>
           <a:lstStyle/>
           <a:p>
-            <a:pPr lvl="0" rtl="0">
-              <a:spcBef>
-                <a:spcPts val="0"/>
-              </a:spcBef>
-              <a:buNone/>
-            </a:pPr>
-            <a:r>
-              <a:rPr lang="en-US" sz="3000" b="1" dirty="0" smtClean="0">
+            <a:pPr lvl="0"/>
+            <a:r>
+              <a:rPr lang="en-US" sz="4400" i="1" u="sng" dirty="0" smtClean="0">
                 <a:solidFill>
                   <a:srgbClr val="FFFFFF"/>
                 </a:solidFill>
+                <a:latin typeface="Roboto Slab"/>
+                <a:ea typeface="Roboto Slab"/>
+                <a:cs typeface="Roboto Slab"/>
+                <a:sym typeface="Roboto Slab"/>
               </a:rPr>
               <a:t>Challenges</a:t>
             </a:r>
+            <a:r>
+              <a:rPr lang="en-US" sz="3200" i="1" u="sng" dirty="0" smtClean="0">
+                <a:solidFill>
+                  <a:srgbClr val="FFFFFF"/>
+                </a:solidFill>
+                <a:latin typeface="Roboto Slab"/>
+                <a:ea typeface="Roboto Slab"/>
+                <a:cs typeface="Roboto Slab"/>
+                <a:sym typeface="Roboto Slab"/>
+              </a:rPr>
+              <a:t> </a:t>
+            </a:r>
+            <a:endParaRPr lang="en" sz="3200" i="1" u="sng" dirty="0">
+              <a:solidFill>
+                <a:srgbClr val="FFFFFF"/>
+              </a:solidFill>
+              <a:latin typeface="Roboto Slab"/>
+              <a:ea typeface="Roboto Slab"/>
+              <a:cs typeface="Roboto Slab"/>
+              <a:sym typeface="Roboto Slab"/>
+            </a:endParaRPr>
           </a:p>
           <a:p>
             <a:pPr lvl="0" rtl="0">
@@ -6530,6 +6590,9 @@
           </a:p>
           <a:p>
             <a:pPr marL="285750" lvl="0" indent="-285750" rtl="0">
+              <a:lnSpc>
+                <a:spcPct val="150000"/>
+              </a:lnSpc>
               <a:spcBef>
                 <a:spcPts val="0"/>
               </a:spcBef>
@@ -6551,6 +6614,9 @@
           </a:p>
           <a:p>
             <a:pPr marL="285750" lvl="0" indent="-285750" rtl="0">
+              <a:lnSpc>
+                <a:spcPct val="150000"/>
+              </a:lnSpc>
               <a:spcBef>
                 <a:spcPts val="0"/>
               </a:spcBef>
@@ -6572,6 +6638,9 @@
           </a:p>
           <a:p>
             <a:pPr marL="285750" lvl="0" indent="-285750" rtl="0">
+              <a:lnSpc>
+                <a:spcPct val="150000"/>
+              </a:lnSpc>
               <a:spcBef>
                 <a:spcPts val="0"/>
               </a:spcBef>
@@ -6593,6 +6662,9 @@
           </a:p>
           <a:p>
             <a:pPr marL="285750" lvl="0" indent="-285750" rtl="0">
+              <a:lnSpc>
+                <a:spcPct val="150000"/>
+              </a:lnSpc>
               <a:spcBef>
                 <a:spcPts val="0"/>
               </a:spcBef>
@@ -6626,6 +6698,9 @@
           </a:p>
           <a:p>
             <a:pPr marL="285750" lvl="0" indent="-285750" rtl="0">
+              <a:lnSpc>
+                <a:spcPct val="150000"/>
+              </a:lnSpc>
               <a:spcBef>
                 <a:spcPts val="0"/>
               </a:spcBef>
@@ -6642,19 +6717,7 @@
                 <a:cs typeface="Roboto Slab"/>
                 <a:sym typeface="Roboto Slab"/>
               </a:rPr>
-              <a:t>Agile Process</a:t>
-            </a:r>
-            <a:r>
-              <a:rPr lang="en-US" sz="2000" dirty="0" smtClean="0">
-                <a:solidFill>
-                  <a:srgbClr val="FFFFFF"/>
-                </a:solidFill>
-                <a:latin typeface="Roboto Slab"/>
-                <a:ea typeface="Roboto Slab"/>
-                <a:cs typeface="Roboto Slab"/>
-                <a:sym typeface="Roboto Slab"/>
-              </a:rPr>
-              <a:t> </a:t>
+              <a:t>Agile Process </a:t>
             </a:r>
           </a:p>
           <a:p>
@@ -6852,7 +6915,7 @@
               <a:buNone/>
             </a:pPr>
             <a:r>
-              <a:rPr lang="en-US" sz="2400" i="1" u="sng" dirty="0" smtClean="0">
+              <a:rPr lang="en-US" sz="4400" i="1" u="sng" dirty="0" smtClean="0">
                 <a:solidFill>
                   <a:srgbClr val="FFFFFF"/>
                 </a:solidFill>
@@ -6861,9 +6924,9 @@
                 <a:cs typeface="Roboto Slab"/>
                 <a:sym typeface="Roboto Slab"/>
               </a:rPr>
-              <a:t>Technologies:</a:t>
-            </a:r>
-            <a:endParaRPr lang="en" sz="2400" i="1" u="sng" dirty="0">
+              <a:t>Technologies</a:t>
+            </a:r>
+            <a:endParaRPr lang="en" sz="4400" i="1" u="sng" dirty="0">
               <a:solidFill>
                 <a:srgbClr val="FFFFFF"/>
               </a:solidFill>
@@ -6911,7 +6974,7 @@
               <a:buChar char="●"/>
             </a:pPr>
             <a:r>
-              <a:rPr lang="en">
+              <a:rPr lang="en" sz="1800" dirty="0">
                 <a:solidFill>
                   <a:srgbClr val="FFFFFF"/>
                 </a:solidFill>
@@ -6930,7 +6993,7 @@
               </a:spcBef>
               <a:buNone/>
             </a:pPr>
-            <a:endParaRPr>
+            <a:endParaRPr sz="1800" dirty="0">
               <a:solidFill>
                 <a:srgbClr val="FFFFFF"/>
               </a:solidFill>
@@ -6952,7 +7015,7 @@
               <a:buChar char="●"/>
             </a:pPr>
             <a:r>
-              <a:rPr lang="en">
+              <a:rPr lang="en" sz="1800" dirty="0">
                 <a:solidFill>
                   <a:srgbClr val="FFFFFF"/>
                 </a:solidFill>
@@ -6971,7 +7034,7 @@
               </a:spcBef>
               <a:buNone/>
             </a:pPr>
-            <a:endParaRPr>
+            <a:endParaRPr sz="1800" dirty="0">
               <a:solidFill>
                 <a:srgbClr val="FFFFFF"/>
               </a:solidFill>
@@ -6993,7 +7056,7 @@
               <a:buChar char="●"/>
             </a:pPr>
             <a:r>
-              <a:rPr lang="en">
+              <a:rPr lang="en" sz="1800" dirty="0">
                 <a:solidFill>
                   <a:srgbClr val="FFFFFF"/>
                 </a:solidFill>
@@ -7012,7 +7075,7 @@
               </a:spcBef>
               <a:buNone/>
             </a:pPr>
-            <a:endParaRPr>
+            <a:endParaRPr sz="1800" dirty="0">
               <a:solidFill>
                 <a:srgbClr val="FFFFFF"/>
               </a:solidFill>
@@ -7034,7 +7097,7 @@
               <a:buChar char="●"/>
             </a:pPr>
             <a:r>
-              <a:rPr lang="en">
+              <a:rPr lang="en" sz="1800" dirty="0">
                 <a:solidFill>
                   <a:srgbClr val="FFFFFF"/>
                 </a:solidFill>
@@ -7053,7 +7116,7 @@
               </a:spcBef>
               <a:buNone/>
             </a:pPr>
-            <a:endParaRPr>
+            <a:endParaRPr sz="1800" dirty="0">
               <a:solidFill>
                 <a:srgbClr val="FFFFFF"/>
               </a:solidFill>
@@ -7075,7 +7138,7 @@
               <a:buChar char="●"/>
             </a:pPr>
             <a:r>
-              <a:rPr lang="en">
+              <a:rPr lang="en" sz="1800" dirty="0">
                 <a:solidFill>
                   <a:srgbClr val="FFFFFF"/>
                 </a:solidFill>
@@ -7094,7 +7157,7 @@
               </a:spcBef>
               <a:buNone/>
             </a:pPr>
-            <a:endParaRPr>
+            <a:endParaRPr sz="1800" dirty="0">
               <a:solidFill>
                 <a:srgbClr val="FFFFFF"/>
               </a:solidFill>
@@ -7116,7 +7179,7 @@
               <a:buChar char="●"/>
             </a:pPr>
             <a:r>
-              <a:rPr lang="en">
+              <a:rPr lang="en" sz="1800" dirty="0">
                 <a:solidFill>
                   <a:srgbClr val="FFFFFF"/>
                 </a:solidFill>
@@ -7135,7 +7198,7 @@
               </a:spcBef>
               <a:buNone/>
             </a:pPr>
-            <a:endParaRPr>
+            <a:endParaRPr sz="1800" dirty="0">
               <a:solidFill>
                 <a:srgbClr val="FFFFFF"/>
               </a:solidFill>
@@ -7157,7 +7220,7 @@
               <a:buChar char="●"/>
             </a:pPr>
             <a:r>
-              <a:rPr lang="en">
+              <a:rPr lang="en" sz="1800" dirty="0">
                 <a:solidFill>
                   <a:srgbClr val="FFFFFF"/>
                 </a:solidFill>
@@ -7176,7 +7239,7 @@
               </a:spcBef>
               <a:buNone/>
             </a:pPr>
-            <a:endParaRPr>
+            <a:endParaRPr sz="1800" dirty="0">
               <a:solidFill>
                 <a:srgbClr val="FFFFFF"/>
               </a:solidFill>
@@ -7198,7 +7261,7 @@
               <a:buChar char="●"/>
             </a:pPr>
             <a:r>
-              <a:rPr lang="en">
+              <a:rPr lang="en" sz="1800" dirty="0" err="1">
                 <a:solidFill>
                   <a:srgbClr val="FFFFFF"/>
                 </a:solidFill>
@@ -7209,6 +7272,15 @@
               </a:rPr>
               <a:t>JSon</a:t>
             </a:r>
+            <a:endParaRPr lang="en" sz="1800" dirty="0">
+              <a:solidFill>
+                <a:srgbClr val="FFFFFF"/>
+              </a:solidFill>
+              <a:latin typeface="Roboto Slab"/>
+              <a:ea typeface="Roboto Slab"/>
+              <a:cs typeface="Roboto Slab"/>
+              <a:sym typeface="Roboto Slab"/>
+            </a:endParaRPr>
           </a:p>
         </p:txBody>
       </p:sp>
@@ -7272,7 +7344,7 @@
               <a:buNone/>
             </a:pPr>
             <a:r>
-              <a:rPr lang="en-US" sz="2400" i="1" u="sng" dirty="0" smtClean="0">
+              <a:rPr lang="en-US" sz="4400" i="1" u="sng" dirty="0" smtClean="0">
                 <a:solidFill>
                   <a:srgbClr val="FFFFFF"/>
                 </a:solidFill>
@@ -7281,10 +7353,10 @@
                 <a:cs typeface="Roboto Slab"/>
                 <a:sym typeface="Roboto Slab"/>
               </a:rPr>
-              <a:t>Project Management</a:t>
-            </a:r>
-            <a:r>
-              <a:rPr lang="en-US" sz="2400" i="1" u="sng" dirty="0" smtClean="0">
+              <a:t>Project </a:t>
+            </a:r>
+            <a:r>
+              <a:rPr lang="en-US" sz="4400" i="1" u="sng" dirty="0" smtClean="0">
                 <a:solidFill>
                   <a:srgbClr val="FFFFFF"/>
                 </a:solidFill>
@@ -7293,9 +7365,9 @@
                 <a:cs typeface="Roboto Slab"/>
                 <a:sym typeface="Roboto Slab"/>
               </a:rPr>
-              <a:t>:</a:t>
-            </a:r>
-            <a:endParaRPr lang="en" sz="2400" i="1" u="sng" dirty="0">
+              <a:t>Management</a:t>
+            </a:r>
+            <a:endParaRPr lang="en" sz="4400" i="1" u="sng" dirty="0">
               <a:solidFill>
                 <a:srgbClr val="FFFFFF"/>
               </a:solidFill>
@@ -7343,7 +7415,7 @@
               <a:buChar char="●"/>
             </a:pPr>
             <a:r>
-              <a:rPr lang="en-US" dirty="0" smtClean="0">
+              <a:rPr lang="en-US" sz="2000" dirty="0" smtClean="0">
                 <a:solidFill>
                   <a:srgbClr val="FFFFFF"/>
                 </a:solidFill>
@@ -7355,7 +7427,7 @@
               <a:t>Trello</a:t>
             </a:r>
             <a:r>
-              <a:rPr lang="en" dirty="0" smtClean="0">
+              <a:rPr lang="en" sz="2000" dirty="0" smtClean="0">
                 <a:solidFill>
                   <a:srgbClr val="FFFFFF"/>
                 </a:solidFill>
@@ -7366,7 +7438,7 @@
               </a:rPr>
               <a:t> </a:t>
             </a:r>
-            <a:endParaRPr lang="en" dirty="0">
+            <a:endParaRPr lang="en" sz="2000" dirty="0">
               <a:solidFill>
                 <a:srgbClr val="FFFFFF"/>
               </a:solidFill>
@@ -7383,7 +7455,7 @@
               </a:spcBef>
               <a:buNone/>
             </a:pPr>
-            <a:endParaRPr dirty="0">
+            <a:endParaRPr sz="2000" dirty="0">
               <a:solidFill>
                 <a:srgbClr val="FFFFFF"/>
               </a:solidFill>
@@ -7405,7 +7477,7 @@
               <a:buChar char="●"/>
             </a:pPr>
             <a:r>
-              <a:rPr lang="en-US" dirty="0" smtClean="0">
+              <a:rPr lang="en-US" sz="2000" dirty="0" smtClean="0">
                 <a:solidFill>
                   <a:srgbClr val="FFFFFF"/>
                 </a:solidFill>
@@ -7416,7 +7488,7 @@
               </a:rPr>
               <a:t>Slack</a:t>
             </a:r>
-            <a:endParaRPr lang="en" dirty="0">
+            <a:endParaRPr lang="en" sz="2000" dirty="0">
               <a:solidFill>
                 <a:srgbClr val="FFFFFF"/>
               </a:solidFill>
@@ -7433,7 +7505,7 @@
               </a:spcBef>
               <a:buNone/>
             </a:pPr>
-            <a:endParaRPr dirty="0">
+            <a:endParaRPr sz="2000" dirty="0">
               <a:solidFill>
                 <a:srgbClr val="FFFFFF"/>
               </a:solidFill>
@@ -7455,7 +7527,7 @@
               <a:buChar char="●"/>
             </a:pPr>
             <a:r>
-              <a:rPr lang="en-US" dirty="0" err="1" smtClean="0">
+              <a:rPr lang="en-US" sz="2000" dirty="0" err="1" smtClean="0">
                 <a:solidFill>
                   <a:srgbClr val="FFFFFF"/>
                 </a:solidFill>
@@ -7466,7 +7538,7 @@
               </a:rPr>
               <a:t>Git</a:t>
             </a:r>
-            <a:endParaRPr lang="en" dirty="0">
+            <a:endParaRPr lang="en" sz="2000" dirty="0">
               <a:solidFill>
                 <a:srgbClr val="FFFFFF"/>
               </a:solidFill>
@@ -7487,7 +7559,7 @@
               <a:buFont typeface="Roboto Slab"/>
               <a:buChar char="●"/>
             </a:pPr>
-            <a:endParaRPr lang="en-US" dirty="0">
+            <a:endParaRPr lang="en-US" sz="2000" dirty="0">
               <a:solidFill>
                 <a:srgbClr val="FFFFFF"/>
               </a:solidFill>
@@ -7509,7 +7581,7 @@
               <a:buChar char="●"/>
             </a:pPr>
             <a:r>
-              <a:rPr lang="en-US" dirty="0" smtClean="0">
+              <a:rPr lang="en-US" sz="2000" dirty="0" smtClean="0">
                 <a:solidFill>
                   <a:srgbClr val="FFFFFF"/>
                 </a:solidFill>
@@ -7520,7 +7592,7 @@
               </a:rPr>
               <a:t>Scrum</a:t>
             </a:r>
-            <a:endParaRPr lang="en" dirty="0">
+            <a:endParaRPr lang="en" sz="2000" dirty="0">
               <a:solidFill>
                 <a:srgbClr val="FFFFFF"/>
               </a:solidFill>
@@ -7602,11 +7674,28 @@
           <a:bodyPr/>
           <a:lstStyle/>
           <a:p>
-            <a:r>
-              <a:rPr lang="en-US" smtClean="0"/>
+            <a:pPr lvl="0"/>
+            <a:r>
+              <a:rPr lang="en-US" sz="4400" i="1" u="sng" dirty="0" smtClean="0">
+                <a:solidFill>
+                  <a:srgbClr val="FFFFFF"/>
+                </a:solidFill>
+                <a:latin typeface="Roboto Slab"/>
+                <a:ea typeface="Roboto Slab"/>
+                <a:cs typeface="Roboto Slab"/>
+                <a:sym typeface="Roboto Slab"/>
+              </a:rPr>
               <a:t>Things That We</a:t>
             </a:r>
-            <a:endParaRPr lang="en-US" dirty="0"/>
+            <a:endParaRPr lang="en" sz="4400" i="1" u="sng" dirty="0">
+              <a:solidFill>
+                <a:srgbClr val="FFFFFF"/>
+              </a:solidFill>
+              <a:latin typeface="Roboto Slab"/>
+              <a:ea typeface="Roboto Slab"/>
+              <a:cs typeface="Roboto Slab"/>
+              <a:sym typeface="Roboto Slab"/>
+            </a:endParaRPr>
           </a:p>
         </p:txBody>
       </p:sp>
@@ -7619,7 +7708,7 @@
         <p:spPr>
           <a:xfrm>
             <a:off x="367553" y="976226"/>
-            <a:ext cx="8615082" cy="1815882"/>
+            <a:ext cx="8615082" cy="3323987"/>
           </a:xfrm>
           <a:prstGeom prst="rect">
             <a:avLst/>
@@ -7632,17 +7721,28 @@
           </a:bodyPr>
           <a:lstStyle/>
           <a:p>
-            <a:r>
-              <a:rPr lang="en-US" dirty="0" smtClean="0">
+            <a:pPr>
+              <a:lnSpc>
+                <a:spcPct val="150000"/>
+              </a:lnSpc>
+            </a:pPr>
+            <a:r>
+              <a:rPr lang="en-US" sz="2000" dirty="0" smtClean="0">
                 <a:solidFill>
                   <a:schemeClr val="tx1"/>
                 </a:solidFill>
               </a:rPr>
-              <a:t>Enjoyed:</a:t>
-            </a:r>
-          </a:p>
-          <a:p>
-            <a:endParaRPr lang="en-US" dirty="0">
+              <a:t>Enjoyed</a:t>
+            </a:r>
+            <a:r>
+              <a:rPr lang="en-US" sz="2000" dirty="0" smtClean="0">
+                <a:solidFill>
+                  <a:schemeClr val="tx1"/>
+                </a:solidFill>
+              </a:rPr>
+              <a:t>:</a:t>
+            </a:r>
+            <a:endParaRPr lang="en-US" sz="2000" dirty="0">
               <a:solidFill>
                 <a:schemeClr val="tx1"/>
               </a:solidFill>
@@ -7650,11 +7750,14 @@
           </a:p>
           <a:p>
             <a:pPr marL="285750" indent="-285750">
+              <a:lnSpc>
+                <a:spcPct val="150000"/>
+              </a:lnSpc>
               <a:buFont typeface="Arial" charset="0"/>
               <a:buChar char="•"/>
             </a:pPr>
             <a:r>
-              <a:rPr lang="en-US" dirty="0" smtClean="0">
+              <a:rPr lang="en-US" sz="2000" dirty="0" smtClean="0">
                 <a:solidFill>
                   <a:schemeClr val="tx1"/>
                 </a:solidFill>
@@ -7664,11 +7767,14 @@
           </a:p>
           <a:p>
             <a:pPr marL="285750" indent="-285750">
+              <a:lnSpc>
+                <a:spcPct val="150000"/>
+              </a:lnSpc>
               <a:buFont typeface="Arial" charset="0"/>
               <a:buChar char="•"/>
             </a:pPr>
             <a:r>
-              <a:rPr lang="en-US" dirty="0" smtClean="0">
+              <a:rPr lang="en-US" sz="2000" dirty="0" smtClean="0">
                 <a:solidFill>
                   <a:schemeClr val="tx1"/>
                 </a:solidFill>
@@ -7678,32 +7784,56 @@
           </a:p>
           <a:p>
             <a:pPr marL="285750" indent="-285750">
+              <a:lnSpc>
+                <a:spcPct val="150000"/>
+              </a:lnSpc>
               <a:buFont typeface="Arial" charset="0"/>
               <a:buChar char="•"/>
             </a:pPr>
-            <a:endParaRPr lang="en-US" dirty="0" smtClean="0">
+            <a:endParaRPr lang="en-US" sz="2000" dirty="0" smtClean="0">
               <a:solidFill>
                 <a:schemeClr val="tx1"/>
               </a:solidFill>
             </a:endParaRPr>
           </a:p>
           <a:p>
-            <a:r>
-              <a:rPr lang="en-US" dirty="0" smtClean="0">
+            <a:pPr>
+              <a:lnSpc>
+                <a:spcPct val="150000"/>
+              </a:lnSpc>
+            </a:pPr>
+            <a:r>
+              <a:rPr lang="en-US" sz="2000" dirty="0" smtClean="0">
                 <a:solidFill>
                   <a:schemeClr val="tx1"/>
                 </a:solidFill>
               </a:rPr>
-              <a:t>Did not Enjoy:</a:t>
-            </a:r>
+              <a:t>Did not Enjoy</a:t>
+            </a:r>
+            <a:r>
+              <a:rPr lang="en-US" sz="2000" dirty="0" smtClean="0">
+                <a:solidFill>
+                  <a:schemeClr val="tx1"/>
+                </a:solidFill>
+              </a:rPr>
+              <a:t>:</a:t>
+            </a:r>
+            <a:endParaRPr lang="en-US" sz="2000" dirty="0" smtClean="0">
+              <a:solidFill>
+                <a:schemeClr val="tx1"/>
+              </a:solidFill>
+            </a:endParaRPr>
           </a:p>
           <a:p>
             <a:pPr marL="285750" indent="-285750">
+              <a:lnSpc>
+                <a:spcPct val="150000"/>
+              </a:lnSpc>
               <a:buFont typeface="Arial" charset="0"/>
               <a:buChar char="•"/>
             </a:pPr>
             <a:r>
-              <a:rPr lang="en-US" dirty="0" smtClean="0">
+              <a:rPr lang="en-US" sz="2000" dirty="0" smtClean="0">
                 <a:solidFill>
                   <a:schemeClr val="tx1"/>
                 </a:solidFill>
@@ -7713,11 +7843,14 @@
           </a:p>
           <a:p>
             <a:pPr marL="285750" indent="-285750">
+              <a:lnSpc>
+                <a:spcPct val="150000"/>
+              </a:lnSpc>
               <a:buFont typeface="Arial" charset="0"/>
               <a:buChar char="•"/>
             </a:pPr>
             <a:r>
-              <a:rPr lang="en-US" dirty="0" smtClean="0">
+              <a:rPr lang="en-US" sz="2000" dirty="0" smtClean="0">
                 <a:solidFill>
                   <a:schemeClr val="tx1"/>
                 </a:solidFill>
@@ -7784,11 +7917,28 @@
           <a:bodyPr/>
           <a:lstStyle/>
           <a:p>
-            <a:r>
-              <a:rPr lang="en-US" smtClean="0"/>
+            <a:pPr lvl="0"/>
+            <a:r>
+              <a:rPr lang="en-US" sz="4400" i="1" u="sng" dirty="0" smtClean="0">
+                <a:solidFill>
+                  <a:srgbClr val="FFFFFF"/>
+                </a:solidFill>
+                <a:latin typeface="Roboto Slab"/>
+                <a:ea typeface="Roboto Slab"/>
+                <a:cs typeface="Roboto Slab"/>
+                <a:sym typeface="Roboto Slab"/>
+              </a:rPr>
               <a:t>Lessons Learned</a:t>
             </a:r>
-            <a:endParaRPr lang="en-US" dirty="0"/>
+            <a:endParaRPr lang="en" sz="4400" i="1" u="sng" dirty="0">
+              <a:solidFill>
+                <a:srgbClr val="FFFFFF"/>
+              </a:solidFill>
+              <a:latin typeface="Roboto Slab"/>
+              <a:ea typeface="Roboto Slab"/>
+              <a:cs typeface="Roboto Slab"/>
+              <a:sym typeface="Roboto Slab"/>
+            </a:endParaRPr>
           </a:p>
         </p:txBody>
       </p:sp>
@@ -7800,8 +7950,8 @@
         </p:nvSpPr>
         <p:spPr>
           <a:xfrm>
-            <a:off x="367553" y="976226"/>
-            <a:ext cx="8615082" cy="2462213"/>
+            <a:off x="340920" y="896183"/>
+            <a:ext cx="8615082" cy="4247317"/>
           </a:xfrm>
           <a:prstGeom prst="rect">
             <a:avLst/>
@@ -7814,17 +7964,28 @@
           </a:bodyPr>
           <a:lstStyle/>
           <a:p>
-            <a:r>
-              <a:rPr lang="en-US" dirty="0" smtClean="0">
+            <a:pPr>
+              <a:lnSpc>
+                <a:spcPct val="150000"/>
+              </a:lnSpc>
+            </a:pPr>
+            <a:r>
+              <a:rPr lang="en-US" sz="1800" dirty="0" smtClean="0">
                 <a:solidFill>
                   <a:schemeClr val="tx1"/>
                 </a:solidFill>
               </a:rPr>
-              <a:t>What worked:</a:t>
-            </a:r>
-          </a:p>
-          <a:p>
-            <a:endParaRPr lang="en-US" dirty="0">
+              <a:t>What worked</a:t>
+            </a:r>
+            <a:r>
+              <a:rPr lang="en-US" sz="1800" dirty="0" smtClean="0">
+                <a:solidFill>
+                  <a:schemeClr val="tx1"/>
+                </a:solidFill>
+              </a:rPr>
+              <a:t>:</a:t>
+            </a:r>
+            <a:endParaRPr lang="en-US" sz="1800" dirty="0">
               <a:solidFill>
                 <a:schemeClr val="tx1"/>
               </a:solidFill>
@@ -7832,11 +7993,14 @@
           </a:p>
           <a:p>
             <a:pPr marL="285750" indent="-285750">
+              <a:lnSpc>
+                <a:spcPct val="150000"/>
+              </a:lnSpc>
               <a:buFont typeface="Arial" charset="0"/>
               <a:buChar char="•"/>
             </a:pPr>
             <a:r>
-              <a:rPr lang="en-US" dirty="0" smtClean="0">
+              <a:rPr lang="en-US" sz="1800" dirty="0" smtClean="0">
                 <a:solidFill>
                   <a:schemeClr val="tx1"/>
                 </a:solidFill>
@@ -7844,14 +8008,22 @@
               <a:t>Version control and </a:t>
             </a:r>
             <a:r>
-              <a:rPr lang="en-US" dirty="0" err="1" smtClean="0">
+              <a:rPr lang="en-US" sz="1800" dirty="0" err="1" smtClean="0">
                 <a:solidFill>
                   <a:schemeClr val="tx1"/>
                 </a:solidFill>
               </a:rPr>
               <a:t>git</a:t>
             </a:r>
-            <a:endParaRPr lang="en-US" dirty="0" smtClean="0">
+            <a:r>
+              <a:rPr lang="en-US" sz="1800" dirty="0" smtClean="0">
+                <a:solidFill>
+                  <a:schemeClr val="tx1"/>
+                </a:solidFill>
+              </a:rPr>
+              <a:t> (mostly worked) </a:t>
+            </a:r>
+            <a:endParaRPr lang="en-US" sz="1800" dirty="0" smtClean="0">
               <a:solidFill>
                 <a:schemeClr val="tx1"/>
               </a:solidFill>
@@ -7859,11 +8031,14 @@
           </a:p>
           <a:p>
             <a:pPr marL="285750" indent="-285750">
+              <a:lnSpc>
+                <a:spcPct val="150000"/>
+              </a:lnSpc>
               <a:buFont typeface="Arial" charset="0"/>
               <a:buChar char="•"/>
             </a:pPr>
             <a:r>
-              <a:rPr lang="en-US" dirty="0" smtClean="0">
+              <a:rPr lang="en-US" sz="1800" dirty="0" smtClean="0">
                 <a:solidFill>
                   <a:schemeClr val="tx1"/>
                 </a:solidFill>
@@ -7873,11 +8048,14 @@
           </a:p>
           <a:p>
             <a:pPr marL="285750" indent="-285750">
+              <a:lnSpc>
+                <a:spcPct val="150000"/>
+              </a:lnSpc>
               <a:buFont typeface="Arial" charset="0"/>
               <a:buChar char="•"/>
             </a:pPr>
             <a:r>
-              <a:rPr lang="en-US" dirty="0" smtClean="0">
+              <a:rPr lang="en-US" sz="1800" dirty="0" smtClean="0">
                 <a:solidFill>
                   <a:schemeClr val="tx1"/>
                 </a:solidFill>
@@ -7887,11 +8065,14 @@
           </a:p>
           <a:p>
             <a:pPr marL="285750" indent="-285750">
+              <a:lnSpc>
+                <a:spcPct val="150000"/>
+              </a:lnSpc>
               <a:buFont typeface="Arial" charset="0"/>
               <a:buChar char="•"/>
             </a:pPr>
             <a:r>
-              <a:rPr lang="en-US" dirty="0" smtClean="0">
+              <a:rPr lang="en-US" sz="1800" dirty="0" smtClean="0">
                 <a:solidFill>
                   <a:schemeClr val="tx1"/>
                 </a:solidFill>
@@ -7901,46 +8082,86 @@
           </a:p>
           <a:p>
             <a:pPr marL="285750" indent="-285750">
+              <a:lnSpc>
+                <a:spcPct val="150000"/>
+              </a:lnSpc>
               <a:buFont typeface="Arial" charset="0"/>
               <a:buChar char="•"/>
             </a:pPr>
-            <a:endParaRPr lang="en-US" dirty="0" smtClean="0">
+            <a:endParaRPr lang="en-US" sz="1800" dirty="0" smtClean="0">
               <a:solidFill>
                 <a:schemeClr val="tx1"/>
               </a:solidFill>
             </a:endParaRPr>
           </a:p>
           <a:p>
-            <a:r>
-              <a:rPr lang="en-US" dirty="0" smtClean="0">
+            <a:pPr>
+              <a:lnSpc>
+                <a:spcPct val="150000"/>
+              </a:lnSpc>
+            </a:pPr>
+            <a:r>
+              <a:rPr lang="en-US" sz="1800" dirty="0" smtClean="0">
                 <a:solidFill>
                   <a:schemeClr val="tx1"/>
                 </a:solidFill>
               </a:rPr>
-              <a:t>What didn’t work:</a:t>
-            </a:r>
+              <a:t>What didn’t work</a:t>
+            </a:r>
+            <a:r>
+              <a:rPr lang="en-US" sz="1800" dirty="0" smtClean="0">
+                <a:solidFill>
+                  <a:schemeClr val="tx1"/>
+                </a:solidFill>
+              </a:rPr>
+              <a:t>:</a:t>
+            </a:r>
+            <a:endParaRPr lang="en-US" sz="1800" dirty="0" smtClean="0">
+              <a:solidFill>
+                <a:schemeClr val="tx1"/>
+              </a:solidFill>
+            </a:endParaRPr>
           </a:p>
           <a:p>
             <a:pPr marL="285750" indent="-285750">
+              <a:lnSpc>
+                <a:spcPct val="150000"/>
+              </a:lnSpc>
               <a:buFont typeface="Arial" charset="0"/>
               <a:buChar char="•"/>
             </a:pPr>
             <a:r>
-              <a:rPr lang="en-US" dirty="0" smtClean="0">
+              <a:rPr lang="en-US" sz="1800" dirty="0" smtClean="0">
                 <a:solidFill>
                   <a:schemeClr val="tx1"/>
                 </a:solidFill>
               </a:rPr>
-              <a:t>Trying to do all the stories</a:t>
-            </a:r>
+              <a:t>Trying to do all the </a:t>
+            </a:r>
+            <a:r>
+              <a:rPr lang="en-US" sz="1800" dirty="0" smtClean="0">
+                <a:solidFill>
+                  <a:schemeClr val="tx1"/>
+                </a:solidFill>
+              </a:rPr>
+              <a:t>story points</a:t>
+            </a:r>
+            <a:endParaRPr lang="en-US" sz="1800" dirty="0" smtClean="0">
+              <a:solidFill>
+                <a:schemeClr val="tx1"/>
+              </a:solidFill>
+            </a:endParaRPr>
           </a:p>
           <a:p>
             <a:pPr marL="285750" indent="-285750">
+              <a:lnSpc>
+                <a:spcPct val="150000"/>
+              </a:lnSpc>
               <a:buFont typeface="Arial" charset="0"/>
               <a:buChar char="•"/>
             </a:pPr>
             <a:r>
-              <a:rPr lang="en-US" dirty="0" smtClean="0">
+              <a:rPr lang="en-US" sz="1800" dirty="0" smtClean="0">
                 <a:solidFill>
                   <a:schemeClr val="tx1"/>
                 </a:solidFill>
@@ -7950,17 +8171,33 @@
           </a:p>
           <a:p>
             <a:pPr marL="285750" indent="-285750">
+              <a:lnSpc>
+                <a:spcPct val="150000"/>
+              </a:lnSpc>
               <a:buFont typeface="Arial" charset="0"/>
               <a:buChar char="•"/>
             </a:pPr>
             <a:r>
-              <a:rPr lang="en-US" dirty="0" smtClean="0">
+              <a:rPr lang="en-US" sz="1800" dirty="0" smtClean="0">
                 <a:solidFill>
                   <a:schemeClr val="tx1"/>
                 </a:solidFill>
               </a:rPr>
-              <a:t>Assuming someone can learn something on their own</a:t>
-            </a:r>
+              <a:t>Assuming someone can learn something on their </a:t>
+            </a:r>
+            <a:r>
+              <a:rPr lang="en-US" sz="1800" dirty="0" smtClean="0">
+                <a:solidFill>
+                  <a:schemeClr val="tx1"/>
+                </a:solidFill>
+              </a:rPr>
+              <a:t>own quickly</a:t>
+            </a:r>
+            <a:endParaRPr lang="en-US" sz="1800" dirty="0" smtClean="0">
+              <a:solidFill>
+                <a:schemeClr val="tx1"/>
+              </a:solidFill>
+            </a:endParaRPr>
           </a:p>
         </p:txBody>
       </p:sp>

</xml_diff>